<commit_message>
Inquiry Config Wizard Removed in lieu of utility
</commit_message>
<xml_diff>
--- a/docs/presentations/Sage300SDK_20191WebSDKOverview.pptx
+++ b/docs/presentations/Sage300SDK_20191WebSDKOverview.pptx
@@ -210,7 +210,7 @@
           <a:p>
             <a:fld id="{F8DE098C-C2B2-472C-9728-F51906A9149D}" type="datetimeFigureOut">
               <a:rPr lang="en-US" smtClean="0"/>
-              <a:t>10/10/2018</a:t>
+              <a:t>10/29/2018</a:t>
             </a:fld>
             <a:endParaRPr lang="en-US"/>
           </a:p>
@@ -2406,7 +2406,7 @@
                 </a:solidFill>
               </a:rPr>
               <a:pPr/>
-              <a:t>2018/10/10</a:t>
+              <a:t>2018/10/29</a:t>
             </a:fld>
             <a:endParaRPr lang="en-US">
               <a:solidFill>
@@ -2711,7 +2711,7 @@
                 </a:solidFill>
               </a:rPr>
               <a:pPr/>
-              <a:t>2018/10/10</a:t>
+              <a:t>2018/10/29</a:t>
             </a:fld>
             <a:endParaRPr lang="en-US">
               <a:solidFill>
@@ -2948,7 +2948,7 @@
             <a:fld id="{EE1C84F4-270C-2249-89D9-A705BDADDAAB}" type="datetime1">
               <a:rPr lang="en-ZA" smtClean="0"/>
               <a:pPr/>
-              <a:t>2018/10/10</a:t>
+              <a:t>2018/10/29</a:t>
             </a:fld>
             <a:endParaRPr lang="en-US"/>
           </a:p>
@@ -3287,7 +3287,7 @@
             <a:fld id="{2AE6851E-022E-D141-8BE0-1745E9557F71}" type="datetime1">
               <a:rPr lang="en-ZA" smtClean="0"/>
               <a:pPr/>
-              <a:t>2018/10/10</a:t>
+              <a:t>2018/10/29</a:t>
             </a:fld>
             <a:endParaRPr lang="en-US"/>
           </a:p>
@@ -5075,7 +5075,7 @@
           <a:p>
             <a:r>
               <a:rPr lang="en-US" dirty="0"/>
-              <a:t>Inquiry Configuration Wizard</a:t>
+              <a:t>Inquiry Configuration Utility</a:t>
             </a:r>
           </a:p>
         </p:txBody>
@@ -5110,7 +5110,7 @@
             <a:pPr lvl="2"/>
             <a:r>
               <a:rPr lang="en-US" sz="1600" dirty="0"/>
-              <a:t>Wizard allows for the creation of metadata to drive generic inquiry and adhoc inquiry displays</a:t>
+              <a:t>Utility allows for the creation of metadata to drive generic inquiry and adhoc inquiry displays</a:t>
             </a:r>
           </a:p>
         </p:txBody>

</xml_diff>